<commit_message>
fixed assorted typos in Module 6 materials
</commit_message>
<xml_diff>
--- a/Slides/Lesson 6.1 Generalizing Similar Functions.pptx
+++ b/Slides/Lesson 6.1 Generalizing Similar Functions.pptx
@@ -159,6 +159,10 @@
   <p:cmAuthor id="0" name="Christine Sacco" initials="" lastIdx="1" clrIdx="0"/>
   <p:cmAuthor id="1" name="beth rochefort" initials="br" lastIdx="3" clrIdx="1"/>
 </p:cmAuthorLst>
+</file>
+
+<file path=ppt/revisionInfo.xml><?xml version="1.0" encoding="utf-8"?>
+<p1510:revInfo xmlns:a="http://schemas.openxmlformats.org/drawingml/2006/main" xmlns:r="http://schemas.openxmlformats.org/officeDocument/2006/relationships" xmlns:p1510="http://schemas.microsoft.com/office/powerpoint/2015/10/main"/>
 </file>
 
 <file path=ppt/diagrams/colors1.xml><?xml version="1.0" encoding="utf-8"?>
@@ -5312,7 +5316,7 @@
             <a:fld id="{CF8F25F6-E1EF-4065-8525-42EDEBD9BD22}" type="datetimeFigureOut">
               <a:rPr lang="en-US" smtClean="0"/>
               <a:pPr/>
-              <a:t>9/6/2017</a:t>
+              <a:t>10/18/2017</a:t>
             </a:fld>
             <a:endParaRPr lang="en-US"/>
           </a:p>
@@ -7040,7 +7044,7 @@
           <a:p>
             <a:fld id="{2F1F79F5-7BEC-496A-AFC7-876E38F64D71}" type="datetime1">
               <a:rPr lang="en-US" smtClean="0"/>
-              <a:t>9/6/2017</a:t>
+              <a:t>10/18/2017</a:t>
             </a:fld>
             <a:endParaRPr lang="en-US"/>
           </a:p>
@@ -7135,7 +7139,7 @@
           <a:p>
             <a:fld id="{0A05703A-7669-4FEA-9056-25299B4D29D4}" type="datetime1">
               <a:rPr lang="en-US" smtClean="0"/>
-              <a:t>9/6/2017</a:t>
+              <a:t>10/18/2017</a:t>
             </a:fld>
             <a:endParaRPr lang="en-US"/>
           </a:p>
@@ -7410,7 +7414,7 @@
           <a:p>
             <a:fld id="{6E5077B5-BB57-49DB-88CA-226A139E5C01}" type="datetime1">
               <a:rPr lang="en-US" smtClean="0"/>
-              <a:t>9/6/2017</a:t>
+              <a:t>10/18/2017</a:t>
             </a:fld>
             <a:endParaRPr lang="en-US"/>
           </a:p>
@@ -7662,7 +7666,7 @@
           <a:p>
             <a:fld id="{C48D9447-CBD6-49A1-89FD-8512A8CF8999}" type="datetime1">
               <a:rPr lang="en-US" smtClean="0"/>
-              <a:t>9/6/2017</a:t>
+              <a:t>10/18/2017</a:t>
             </a:fld>
             <a:endParaRPr lang="en-US"/>
           </a:p>
@@ -7830,7 +7834,7 @@
           <a:p>
             <a:fld id="{A3639A2A-823D-48B7-9ACE-7FAF42870BA9}" type="datetime1">
               <a:rPr lang="en-US" smtClean="0"/>
-              <a:t>9/6/2017</a:t>
+              <a:t>10/18/2017</a:t>
             </a:fld>
             <a:endParaRPr lang="en-US"/>
           </a:p>
@@ -8008,7 +8012,7 @@
           <a:p>
             <a:fld id="{ED1B6996-82E9-463C-972C-7B56056E426C}" type="datetime1">
               <a:rPr lang="en-US" smtClean="0"/>
-              <a:t>9/6/2017</a:t>
+              <a:t>10/18/2017</a:t>
             </a:fld>
             <a:endParaRPr lang="en-US"/>
           </a:p>
@@ -8182,7 +8186,7 @@
           <a:p>
             <a:fld id="{E22ED4DA-448D-4BB1-B935-CC112220207B}" type="datetime1">
               <a:rPr lang="en-US" smtClean="0"/>
-              <a:t>9/6/2017</a:t>
+              <a:t>10/18/2017</a:t>
             </a:fld>
             <a:endParaRPr lang="en-US"/>
           </a:p>
@@ -8355,7 +8359,7 @@
           <a:p>
             <a:fld id="{E22ED4DA-448D-4BB1-B935-CC112220207B}" type="datetime1">
               <a:rPr lang="en-US" smtClean="0"/>
-              <a:t>9/6/2017</a:t>
+              <a:t>10/18/2017</a:t>
             </a:fld>
             <a:endParaRPr lang="en-US"/>
           </a:p>
@@ -8615,7 +8619,7 @@
           <a:p>
             <a:fld id="{FF5D65A6-AB94-4435-B0B7-3743215FA46C}" type="datetime1">
               <a:rPr lang="en-US" smtClean="0"/>
-              <a:t>9/6/2017</a:t>
+              <a:t>10/18/2017</a:t>
             </a:fld>
             <a:endParaRPr lang="en-US"/>
           </a:p>
@@ -8791,7 +8795,7 @@
           <a:p>
             <a:fld id="{FF5D65A6-AB94-4435-B0B7-3743215FA46C}" type="datetime1">
               <a:rPr lang="en-US" smtClean="0"/>
-              <a:t>9/6/2017</a:t>
+              <a:t>10/18/2017</a:t>
             </a:fld>
             <a:endParaRPr lang="en-US"/>
           </a:p>
@@ -9085,7 +9089,7 @@
           <a:p>
             <a:fld id="{7C193DC4-6EF0-48C9-B29C-616106A645E1}" type="datetime1">
               <a:rPr lang="en-US" smtClean="0"/>
-              <a:t>9/6/2017</a:t>
+              <a:t>10/18/2017</a:t>
             </a:fld>
             <a:endParaRPr lang="en-US"/>
           </a:p>
@@ -9370,7 +9374,7 @@
           <a:p>
             <a:fld id="{5D1846AD-9252-4647-9435-4C2AC365653A}" type="datetime1">
               <a:rPr lang="en-US" smtClean="0"/>
-              <a:t>9/6/2017</a:t>
+              <a:t>10/18/2017</a:t>
             </a:fld>
             <a:endParaRPr lang="en-US"/>
           </a:p>
@@ -9789,7 +9793,7 @@
           <a:p>
             <a:fld id="{CE56DC10-3561-4063-A6AF-C1CC7A41040A}" type="datetime1">
               <a:rPr lang="en-US" smtClean="0"/>
-              <a:t>9/6/2017</a:t>
+              <a:t>10/18/2017</a:t>
             </a:fld>
             <a:endParaRPr lang="en-US"/>
           </a:p>
@@ -9906,7 +9910,7 @@
           <a:p>
             <a:fld id="{2F7B77F5-1464-4F6B-92A8-64FC8A508293}" type="datetime1">
               <a:rPr lang="en-US" smtClean="0"/>
-              <a:t>9/6/2017</a:t>
+              <a:t>10/18/2017</a:t>
             </a:fld>
             <a:endParaRPr lang="en-US"/>
           </a:p>
@@ -10129,7 +10133,7 @@
           <a:p>
             <a:fld id="{02B3F677-983B-48DB-ADFD-63FE6CBC7FB2}" type="datetime1">
               <a:rPr lang="en-US" smtClean="0"/>
-              <a:t>9/6/2017</a:t>
+              <a:t>10/18/2017</a:t>
             </a:fld>
             <a:endParaRPr lang="en-US"/>
           </a:p>
@@ -14770,8 +14774,19 @@
                 <a:latin typeface="Consolas" pitchFamily="49" charset="0"/>
                 <a:cs typeface="Consolas" pitchFamily="49" charset="0"/>
               </a:rPr>
-              <a:t>;; anchovies in place of each layer of onions</a:t>
-            </a:r>
+              <a:t>;; onions in place of each layer </a:t>
+            </a:r>
+            <a:r>
+              <a:rPr lang="en-US" b="1">
+                <a:latin typeface="Consolas" pitchFamily="49" charset="0"/>
+                <a:cs typeface="Consolas" pitchFamily="49" charset="0"/>
+              </a:rPr>
+              <a:t>of anchovies</a:t>
+            </a:r>
+            <a:endParaRPr lang="en-US" b="1" dirty="0">
+              <a:latin typeface="Consolas" pitchFamily="49" charset="0"/>
+              <a:cs typeface="Consolas" pitchFamily="49" charset="0"/>
+            </a:endParaRPr>
           </a:p>
           <a:p>
             <a:pPr marL="0" indent="0">

</xml_diff>

<commit_message>
working on L8.2 binary search
</commit_message>
<xml_diff>
--- a/Slides/Lesson 6.1 Generalizing Similar Functions.pptx
+++ b/Slides/Lesson 6.1 Generalizing Similar Functions.pptx
@@ -159,6 +159,10 @@
   <p:cmAuthor id="0" name="Christine Sacco" initials="" lastIdx="1" clrIdx="0"/>
   <p:cmAuthor id="1" name="beth rochefort" initials="br" lastIdx="3" clrIdx="1"/>
 </p:cmAuthorLst>
+</file>
+
+<file path=ppt/revisionInfo.xml><?xml version="1.0" encoding="utf-8"?>
+<p1510:revInfo xmlns:a="http://schemas.openxmlformats.org/drawingml/2006/main" xmlns:r="http://schemas.openxmlformats.org/officeDocument/2006/relationships" xmlns:p1510="http://schemas.microsoft.com/office/powerpoint/2015/10/main"/>
 </file>
 
 <file path=ppt/diagrams/colors1.xml><?xml version="1.0" encoding="utf-8"?>
@@ -5312,7 +5316,7 @@
             <a:fld id="{CF8F25F6-E1EF-4065-8525-42EDEBD9BD22}" type="datetimeFigureOut">
               <a:rPr lang="en-US" smtClean="0"/>
               <a:pPr/>
-              <a:t>9/6/2017</a:t>
+              <a:t>10/18/2017</a:t>
             </a:fld>
             <a:endParaRPr lang="en-US"/>
           </a:p>
@@ -7040,7 +7044,7 @@
           <a:p>
             <a:fld id="{2F1F79F5-7BEC-496A-AFC7-876E38F64D71}" type="datetime1">
               <a:rPr lang="en-US" smtClean="0"/>
-              <a:t>9/6/2017</a:t>
+              <a:t>10/18/2017</a:t>
             </a:fld>
             <a:endParaRPr lang="en-US"/>
           </a:p>
@@ -7135,7 +7139,7 @@
           <a:p>
             <a:fld id="{0A05703A-7669-4FEA-9056-25299B4D29D4}" type="datetime1">
               <a:rPr lang="en-US" smtClean="0"/>
-              <a:t>9/6/2017</a:t>
+              <a:t>10/18/2017</a:t>
             </a:fld>
             <a:endParaRPr lang="en-US"/>
           </a:p>
@@ -7410,7 +7414,7 @@
           <a:p>
             <a:fld id="{6E5077B5-BB57-49DB-88CA-226A139E5C01}" type="datetime1">
               <a:rPr lang="en-US" smtClean="0"/>
-              <a:t>9/6/2017</a:t>
+              <a:t>10/18/2017</a:t>
             </a:fld>
             <a:endParaRPr lang="en-US"/>
           </a:p>
@@ -7662,7 +7666,7 @@
           <a:p>
             <a:fld id="{C48D9447-CBD6-49A1-89FD-8512A8CF8999}" type="datetime1">
               <a:rPr lang="en-US" smtClean="0"/>
-              <a:t>9/6/2017</a:t>
+              <a:t>10/18/2017</a:t>
             </a:fld>
             <a:endParaRPr lang="en-US"/>
           </a:p>
@@ -7830,7 +7834,7 @@
           <a:p>
             <a:fld id="{A3639A2A-823D-48B7-9ACE-7FAF42870BA9}" type="datetime1">
               <a:rPr lang="en-US" smtClean="0"/>
-              <a:t>9/6/2017</a:t>
+              <a:t>10/18/2017</a:t>
             </a:fld>
             <a:endParaRPr lang="en-US"/>
           </a:p>
@@ -8008,7 +8012,7 @@
           <a:p>
             <a:fld id="{ED1B6996-82E9-463C-972C-7B56056E426C}" type="datetime1">
               <a:rPr lang="en-US" smtClean="0"/>
-              <a:t>9/6/2017</a:t>
+              <a:t>10/18/2017</a:t>
             </a:fld>
             <a:endParaRPr lang="en-US"/>
           </a:p>
@@ -8182,7 +8186,7 @@
           <a:p>
             <a:fld id="{E22ED4DA-448D-4BB1-B935-CC112220207B}" type="datetime1">
               <a:rPr lang="en-US" smtClean="0"/>
-              <a:t>9/6/2017</a:t>
+              <a:t>10/18/2017</a:t>
             </a:fld>
             <a:endParaRPr lang="en-US"/>
           </a:p>
@@ -8355,7 +8359,7 @@
           <a:p>
             <a:fld id="{E22ED4DA-448D-4BB1-B935-CC112220207B}" type="datetime1">
               <a:rPr lang="en-US" smtClean="0"/>
-              <a:t>9/6/2017</a:t>
+              <a:t>10/18/2017</a:t>
             </a:fld>
             <a:endParaRPr lang="en-US"/>
           </a:p>
@@ -8615,7 +8619,7 @@
           <a:p>
             <a:fld id="{FF5D65A6-AB94-4435-B0B7-3743215FA46C}" type="datetime1">
               <a:rPr lang="en-US" smtClean="0"/>
-              <a:t>9/6/2017</a:t>
+              <a:t>10/18/2017</a:t>
             </a:fld>
             <a:endParaRPr lang="en-US"/>
           </a:p>
@@ -8791,7 +8795,7 @@
           <a:p>
             <a:fld id="{FF5D65A6-AB94-4435-B0B7-3743215FA46C}" type="datetime1">
               <a:rPr lang="en-US" smtClean="0"/>
-              <a:t>9/6/2017</a:t>
+              <a:t>10/18/2017</a:t>
             </a:fld>
             <a:endParaRPr lang="en-US"/>
           </a:p>
@@ -9085,7 +9089,7 @@
           <a:p>
             <a:fld id="{7C193DC4-6EF0-48C9-B29C-616106A645E1}" type="datetime1">
               <a:rPr lang="en-US" smtClean="0"/>
-              <a:t>9/6/2017</a:t>
+              <a:t>10/18/2017</a:t>
             </a:fld>
             <a:endParaRPr lang="en-US"/>
           </a:p>
@@ -9370,7 +9374,7 @@
           <a:p>
             <a:fld id="{5D1846AD-9252-4647-9435-4C2AC365653A}" type="datetime1">
               <a:rPr lang="en-US" smtClean="0"/>
-              <a:t>9/6/2017</a:t>
+              <a:t>10/18/2017</a:t>
             </a:fld>
             <a:endParaRPr lang="en-US"/>
           </a:p>
@@ -9789,7 +9793,7 @@
           <a:p>
             <a:fld id="{CE56DC10-3561-4063-A6AF-C1CC7A41040A}" type="datetime1">
               <a:rPr lang="en-US" smtClean="0"/>
-              <a:t>9/6/2017</a:t>
+              <a:t>10/18/2017</a:t>
             </a:fld>
             <a:endParaRPr lang="en-US"/>
           </a:p>
@@ -9906,7 +9910,7 @@
           <a:p>
             <a:fld id="{2F7B77F5-1464-4F6B-92A8-64FC8A508293}" type="datetime1">
               <a:rPr lang="en-US" smtClean="0"/>
-              <a:t>9/6/2017</a:t>
+              <a:t>10/18/2017</a:t>
             </a:fld>
             <a:endParaRPr lang="en-US"/>
           </a:p>
@@ -10129,7 +10133,7 @@
           <a:p>
             <a:fld id="{02B3F677-983B-48DB-ADFD-63FE6CBC7FB2}" type="datetime1">
               <a:rPr lang="en-US" smtClean="0"/>
-              <a:t>9/6/2017</a:t>
+              <a:t>10/18/2017</a:t>
             </a:fld>
             <a:endParaRPr lang="en-US"/>
           </a:p>
@@ -14770,8 +14774,19 @@
                 <a:latin typeface="Consolas" pitchFamily="49" charset="0"/>
                 <a:cs typeface="Consolas" pitchFamily="49" charset="0"/>
               </a:rPr>
-              <a:t>;; anchovies in place of each layer of onions</a:t>
-            </a:r>
+              <a:t>;; onions in place of each layer </a:t>
+            </a:r>
+            <a:r>
+              <a:rPr lang="en-US" b="1">
+                <a:latin typeface="Consolas" pitchFamily="49" charset="0"/>
+                <a:cs typeface="Consolas" pitchFamily="49" charset="0"/>
+              </a:rPr>
+              <a:t>of anchovies</a:t>
+            </a:r>
+            <a:endParaRPr lang="en-US" b="1" dirty="0">
+              <a:latin typeface="Consolas" pitchFamily="49" charset="0"/>
+              <a:cs typeface="Consolas" pitchFamily="49" charset="0"/>
+            </a:endParaRPr>
           </a:p>
           <a:p>
             <a:pPr marL="0" indent="0">

</xml_diff>